<commit_message>
Minor modifications to slides
git-svn-id: https://euclid.esac.esa.int/svn/ESA/SOC/SOC-3-DEV/SOC-3-07-QLook/QPF/branches/V1.0@12913 463500fe-d6be-4184-9b20-47717e75ecac
</commit_message>
<xml_diff>
--- a/doc/QPF_Architecture.pptx
+++ b/doc/QPF_Architecture.pptx
@@ -296,7 +296,7 @@
             <a:fld id="{8E36636D-D922-432D-A958-524484B5923D}" type="datetimeFigureOut">
               <a:rPr lang="en-US" smtClean="0"/>
               <a:pPr/>
-              <a:t>10/5/2015</a:t>
+              <a:t>4/7/2016</a:t>
             </a:fld>
             <a:endParaRPr lang="en-US"/>
           </a:p>
@@ -463,7 +463,7 @@
             <a:fld id="{8E36636D-D922-432D-A958-524484B5923D}" type="datetimeFigureOut">
               <a:rPr lang="en-US" smtClean="0"/>
               <a:pPr/>
-              <a:t>10/5/2015</a:t>
+              <a:t>4/7/2016</a:t>
             </a:fld>
             <a:endParaRPr lang="en-US"/>
           </a:p>
@@ -640,7 +640,7 @@
             <a:fld id="{8E36636D-D922-432D-A958-524484B5923D}" type="datetimeFigureOut">
               <a:rPr lang="en-US" smtClean="0"/>
               <a:pPr/>
-              <a:t>10/5/2015</a:t>
+              <a:t>4/7/2016</a:t>
             </a:fld>
             <a:endParaRPr lang="en-US"/>
           </a:p>
@@ -807,7 +807,7 @@
             <a:fld id="{8E36636D-D922-432D-A958-524484B5923D}" type="datetimeFigureOut">
               <a:rPr lang="en-US" smtClean="0"/>
               <a:pPr/>
-              <a:t>10/5/2015</a:t>
+              <a:t>4/7/2016</a:t>
             </a:fld>
             <a:endParaRPr lang="en-US"/>
           </a:p>
@@ -1048,7 +1048,7 @@
             <a:fld id="{8E36636D-D922-432D-A958-524484B5923D}" type="datetimeFigureOut">
               <a:rPr lang="en-US" smtClean="0"/>
               <a:pPr/>
-              <a:t>10/5/2015</a:t>
+              <a:t>4/7/2016</a:t>
             </a:fld>
             <a:endParaRPr lang="en-US"/>
           </a:p>
@@ -1333,7 +1333,7 @@
             <a:fld id="{8E36636D-D922-432D-A958-524484B5923D}" type="datetimeFigureOut">
               <a:rPr lang="en-US" smtClean="0"/>
               <a:pPr/>
-              <a:t>10/5/2015</a:t>
+              <a:t>4/7/2016</a:t>
             </a:fld>
             <a:endParaRPr lang="en-US"/>
           </a:p>
@@ -1752,7 +1752,7 @@
             <a:fld id="{8E36636D-D922-432D-A958-524484B5923D}" type="datetimeFigureOut">
               <a:rPr lang="en-US" smtClean="0"/>
               <a:pPr/>
-              <a:t>10/5/2015</a:t>
+              <a:t>4/7/2016</a:t>
             </a:fld>
             <a:endParaRPr lang="en-US"/>
           </a:p>
@@ -1867,7 +1867,7 @@
             <a:fld id="{8E36636D-D922-432D-A958-524484B5923D}" type="datetimeFigureOut">
               <a:rPr lang="en-US" smtClean="0"/>
               <a:pPr/>
-              <a:t>10/5/2015</a:t>
+              <a:t>4/7/2016</a:t>
             </a:fld>
             <a:endParaRPr lang="en-US"/>
           </a:p>
@@ -1959,7 +1959,7 @@
             <a:fld id="{8E36636D-D922-432D-A958-524484B5923D}" type="datetimeFigureOut">
               <a:rPr lang="en-US" smtClean="0"/>
               <a:pPr/>
-              <a:t>10/5/2015</a:t>
+              <a:t>4/7/2016</a:t>
             </a:fld>
             <a:endParaRPr lang="en-US"/>
           </a:p>
@@ -2240,7 +2240,7 @@
             <a:fld id="{8E36636D-D922-432D-A958-524484B5923D}" type="datetimeFigureOut">
               <a:rPr lang="en-US" smtClean="0"/>
               <a:pPr/>
-              <a:t>10/5/2015</a:t>
+              <a:t>4/7/2016</a:t>
             </a:fld>
             <a:endParaRPr lang="en-US"/>
           </a:p>
@@ -2501,7 +2501,7 @@
             <a:fld id="{8E36636D-D922-432D-A958-524484B5923D}" type="datetimeFigureOut">
               <a:rPr lang="en-US" smtClean="0"/>
               <a:pPr/>
-              <a:t>10/5/2015</a:t>
+              <a:t>4/7/2016</a:t>
             </a:fld>
             <a:endParaRPr lang="en-US"/>
           </a:p>
@@ -2711,7 +2711,7 @@
             <a:fld id="{8E36636D-D922-432D-A958-524484B5923D}" type="datetimeFigureOut">
               <a:rPr lang="en-US" smtClean="0"/>
               <a:pPr/>
-              <a:t>10/5/2015</a:t>
+              <a:t>4/7/2016</a:t>
             </a:fld>
             <a:endParaRPr lang="en-US"/>
           </a:p>
@@ -12216,8 +12216,8 @@
         </p:nvSpPr>
         <p:spPr>
           <a:xfrm>
-            <a:off x="-1481707" y="6613304"/>
-            <a:ext cx="5435705" cy="4741861"/>
+            <a:off x="309348" y="1164649"/>
+            <a:ext cx="5435705" cy="4522847"/>
           </a:xfrm>
           <a:prstGeom prst="rect">
             <a:avLst/>

</xml_diff>